<commit_message>
Final commit du pptx, second commit du Cahier des charge et la modification de la bd
</commit_message>
<xml_diff>
--- a/Doc_Importants/PresentationProjet.pptx
+++ b/Doc_Importants/PresentationProjet.pptx
@@ -1,29 +1,36 @@
 
 <file path=ppt/presentation.xml><?xml version="1.0" encoding="utf-8"?>
-<p:presentation xmlns:a="http://schemas.openxmlformats.org/drawingml/2006/main" xmlns:r="http://schemas.openxmlformats.org/officeDocument/2006/relationships" xmlns:p="http://schemas.openxmlformats.org/presentationml/2006/main" saveSubsetFonts="1" embedTrueTypeFonts="true">
+<p:presentation xmlns:a="http://schemas.openxmlformats.org/drawingml/2006/main" xmlns:r="http://schemas.openxmlformats.org/officeDocument/2006/relationships" xmlns:p="http://schemas.openxmlformats.org/presentationml/2006/main" embedTrueTypeFonts="1" saveSubsetFonts="1">
   <p:sldMasterIdLst>
     <p:sldMasterId id="2147483648" r:id="rId1"/>
   </p:sldMasterIdLst>
   <p:sldIdLst>
-    <p:sldId id="256" r:id="rId6"/>
-    <p:sldId id="257" r:id="rId7"/>
-    <p:sldId id="258" r:id="rId8"/>
-    <p:sldId id="259" r:id="rId9"/>
-    <p:sldId id="260" r:id="rId10"/>
-    <p:sldId id="261" r:id="rId11"/>
-    <p:sldId id="262" r:id="rId12"/>
-    <p:sldId id="263" r:id="rId13"/>
-    <p:sldId id="264" r:id="rId14"/>
-    <p:sldId id="265" r:id="rId15"/>
-    <p:sldId id="266" r:id="rId16"/>
-    <p:sldId id="267" r:id="rId17"/>
-    <p:sldId id="268" r:id="rId18"/>
+    <p:sldId id="256" r:id="rId2"/>
+    <p:sldId id="257" r:id="rId3"/>
+    <p:sldId id="258" r:id="rId4"/>
+    <p:sldId id="259" r:id="rId5"/>
+    <p:sldId id="260" r:id="rId6"/>
+    <p:sldId id="261" r:id="rId7"/>
+    <p:sldId id="262" r:id="rId8"/>
+    <p:sldId id="263" r:id="rId9"/>
+    <p:sldId id="264" r:id="rId10"/>
+    <p:sldId id="265" r:id="rId11"/>
+    <p:sldId id="266" r:id="rId12"/>
+    <p:sldId id="267" r:id="rId13"/>
+    <p:sldId id="268" r:id="rId14"/>
   </p:sldIdLst>
   <p:sldSz cx="18288000" cy="10287000"/>
   <p:notesSz cx="6858000" cy="9144000"/>
   <p:embeddedFontLst>
     <p:embeddedFont>
-      <p:font typeface="Open Sans Bold" charset="1" panose="00000000000000000000"/>
+      <p:font typeface="Calibri" panose="020F0502020204030204" pitchFamily="34" charset="0"/>
+      <p:regular r:id="rId15"/>
+      <p:bold r:id="rId16"/>
+      <p:italic r:id="rId17"/>
+      <p:boldItalic r:id="rId18"/>
+    </p:embeddedFont>
+    <p:embeddedFont>
+      <p:font typeface="Open Sans Bold" panose="020B0604020202020204" charset="0"/>
       <p:regular r:id="rId19"/>
     </p:embeddedFont>
   </p:embeddedFontLst>
@@ -122,6 +129,22 @@
       </a:defRPr>
     </a:lvl9pPr>
   </p:defaultTextStyle>
+  <p:extLst>
+    <p:ext uri="{EFAFB233-063F-42B5-8137-9DF3F51BA10A}">
+      <p15:sldGuideLst xmlns:p15="http://schemas.microsoft.com/office/powerpoint/2012/main">
+        <p15:guide id="1" orient="horz" pos="2160">
+          <p15:clr>
+            <a:srgbClr val="A4A3A4"/>
+          </p15:clr>
+        </p15:guide>
+        <p15:guide id="2" pos="2880">
+          <p15:clr>
+            <a:srgbClr val="A4A3A4"/>
+          </p15:clr>
+        </p15:guide>
+      </p15:sldGuideLst>
+    </p:ext>
+  </p:extLst>
 </p:presentation>
 </file>
 
@@ -163,10 +186,9 @@
           <a:lstStyle/>
           <a:p>
             <a:r>
-              <a:rPr lang="en-US" smtClean="0"/>
+              <a:rPr lang="en-US"/>
               <a:t>Click to edit Master title style</a:t>
             </a:r>
-            <a:endParaRPr lang="en-US"/>
           </a:p>
         </p:txBody>
       </p:sp>
@@ -282,10 +304,9 @@
           </a:lstStyle>
           <a:p>
             <a:r>
-              <a:rPr lang="en-US" smtClean="0"/>
+              <a:rPr lang="en-US"/>
               <a:t>Click to edit Master subtitle style</a:t>
             </a:r>
-            <a:endParaRPr lang="en-US"/>
           </a:p>
         </p:txBody>
       </p:sp>
@@ -307,7 +328,7 @@
             <a:fld id="{1D8BD707-D9CF-40AE-B4C6-C98DA3205C09}" type="datetimeFigureOut">
               <a:rPr lang="en-US" smtClean="0"/>
               <a:pPr/>
-              <a:t>8/1/2011</a:t>
+              <a:t>6/28/2024</a:t>
             </a:fld>
             <a:endParaRPr lang="en-US"/>
           </a:p>
@@ -397,10 +418,9 @@
           <a:lstStyle/>
           <a:p>
             <a:r>
-              <a:rPr lang="en-US" smtClean="0"/>
+              <a:rPr lang="en-US"/>
               <a:t>Click to edit Master title style</a:t>
             </a:r>
-            <a:endParaRPr lang="en-US"/>
           </a:p>
         </p:txBody>
       </p:sp>
@@ -421,38 +441,37 @@
           <a:p>
             <a:pPr lvl="0"/>
             <a:r>
-              <a:rPr lang="en-US" smtClean="0"/>
+              <a:rPr lang="en-US"/>
               <a:t>Click to edit Master text styles</a:t>
             </a:r>
           </a:p>
           <a:p>
             <a:pPr lvl="1"/>
             <a:r>
-              <a:rPr lang="en-US" smtClean="0"/>
+              <a:rPr lang="en-US"/>
               <a:t>Second level</a:t>
             </a:r>
           </a:p>
           <a:p>
             <a:pPr lvl="2"/>
             <a:r>
-              <a:rPr lang="en-US" smtClean="0"/>
+              <a:rPr lang="en-US"/>
               <a:t>Third level</a:t>
             </a:r>
           </a:p>
           <a:p>
             <a:pPr lvl="3"/>
             <a:r>
-              <a:rPr lang="en-US" smtClean="0"/>
+              <a:rPr lang="en-US"/>
               <a:t>Fourth level</a:t>
             </a:r>
           </a:p>
           <a:p>
             <a:pPr lvl="4"/>
             <a:r>
-              <a:rPr lang="en-US" smtClean="0"/>
+              <a:rPr lang="en-US"/>
               <a:t>Fifth level</a:t>
             </a:r>
-            <a:endParaRPr lang="en-US"/>
           </a:p>
         </p:txBody>
       </p:sp>
@@ -474,7 +493,7 @@
             <a:fld id="{1D8BD707-D9CF-40AE-B4C6-C98DA3205C09}" type="datetimeFigureOut">
               <a:rPr lang="en-US" smtClean="0"/>
               <a:pPr/>
-              <a:t>8/1/2011</a:t>
+              <a:t>6/28/2024</a:t>
             </a:fld>
             <a:endParaRPr lang="en-US"/>
           </a:p>
@@ -569,10 +588,9 @@
           <a:lstStyle/>
           <a:p>
             <a:r>
-              <a:rPr lang="en-US" smtClean="0"/>
+              <a:rPr lang="en-US"/>
               <a:t>Click to edit Master title style</a:t>
             </a:r>
-            <a:endParaRPr lang="en-US"/>
           </a:p>
         </p:txBody>
       </p:sp>
@@ -598,38 +616,37 @@
           <a:p>
             <a:pPr lvl="0"/>
             <a:r>
-              <a:rPr lang="en-US" smtClean="0"/>
+              <a:rPr lang="en-US"/>
               <a:t>Click to edit Master text styles</a:t>
             </a:r>
           </a:p>
           <a:p>
             <a:pPr lvl="1"/>
             <a:r>
-              <a:rPr lang="en-US" smtClean="0"/>
+              <a:rPr lang="en-US"/>
               <a:t>Second level</a:t>
             </a:r>
           </a:p>
           <a:p>
             <a:pPr lvl="2"/>
             <a:r>
-              <a:rPr lang="en-US" smtClean="0"/>
+              <a:rPr lang="en-US"/>
               <a:t>Third level</a:t>
             </a:r>
           </a:p>
           <a:p>
             <a:pPr lvl="3"/>
             <a:r>
-              <a:rPr lang="en-US" smtClean="0"/>
+              <a:rPr lang="en-US"/>
               <a:t>Fourth level</a:t>
             </a:r>
           </a:p>
           <a:p>
             <a:pPr lvl="4"/>
             <a:r>
-              <a:rPr lang="en-US" smtClean="0"/>
+              <a:rPr lang="en-US"/>
               <a:t>Fifth level</a:t>
             </a:r>
-            <a:endParaRPr lang="en-US"/>
           </a:p>
         </p:txBody>
       </p:sp>
@@ -651,7 +668,7 @@
             <a:fld id="{1D8BD707-D9CF-40AE-B4C6-C98DA3205C09}" type="datetimeFigureOut">
               <a:rPr lang="en-US" smtClean="0"/>
               <a:pPr/>
-              <a:t>8/1/2011</a:t>
+              <a:t>6/28/2024</a:t>
             </a:fld>
             <a:endParaRPr lang="en-US"/>
           </a:p>
@@ -741,10 +758,9 @@
           <a:lstStyle/>
           <a:p>
             <a:r>
-              <a:rPr lang="en-US" smtClean="0"/>
+              <a:rPr lang="en-US"/>
               <a:t>Click to edit Master title style</a:t>
             </a:r>
-            <a:endParaRPr lang="en-US"/>
           </a:p>
         </p:txBody>
       </p:sp>
@@ -765,38 +781,37 @@
           <a:p>
             <a:pPr lvl="0"/>
             <a:r>
-              <a:rPr lang="en-US" smtClean="0"/>
+              <a:rPr lang="en-US"/>
               <a:t>Click to edit Master text styles</a:t>
             </a:r>
           </a:p>
           <a:p>
             <a:pPr lvl="1"/>
             <a:r>
-              <a:rPr lang="en-US" smtClean="0"/>
+              <a:rPr lang="en-US"/>
               <a:t>Second level</a:t>
             </a:r>
           </a:p>
           <a:p>
             <a:pPr lvl="2"/>
             <a:r>
-              <a:rPr lang="en-US" smtClean="0"/>
+              <a:rPr lang="en-US"/>
               <a:t>Third level</a:t>
             </a:r>
           </a:p>
           <a:p>
             <a:pPr lvl="3"/>
             <a:r>
-              <a:rPr lang="en-US" smtClean="0"/>
+              <a:rPr lang="en-US"/>
               <a:t>Fourth level</a:t>
             </a:r>
           </a:p>
           <a:p>
             <a:pPr lvl="4"/>
             <a:r>
-              <a:rPr lang="en-US" smtClean="0"/>
+              <a:rPr lang="en-US"/>
               <a:t>Fifth level</a:t>
             </a:r>
-            <a:endParaRPr lang="en-US"/>
           </a:p>
         </p:txBody>
       </p:sp>
@@ -818,7 +833,7 @@
             <a:fld id="{1D8BD707-D9CF-40AE-B4C6-C98DA3205C09}" type="datetimeFigureOut">
               <a:rPr lang="en-US" smtClean="0"/>
               <a:pPr/>
-              <a:t>8/1/2011</a:t>
+              <a:t>6/28/2024</a:t>
             </a:fld>
             <a:endParaRPr lang="en-US"/>
           </a:p>
@@ -917,10 +932,9 @@
           </a:lstStyle>
           <a:p>
             <a:r>
-              <a:rPr lang="en-US" smtClean="0"/>
+              <a:rPr lang="en-US"/>
               <a:t>Click to edit Master title style</a:t>
             </a:r>
-            <a:endParaRPr lang="en-US"/>
           </a:p>
         </p:txBody>
       </p:sp>
@@ -1037,7 +1051,7 @@
           <a:p>
             <a:pPr lvl="0"/>
             <a:r>
-              <a:rPr lang="en-US" smtClean="0"/>
+              <a:rPr lang="en-US"/>
               <a:t>Click to edit Master text styles</a:t>
             </a:r>
           </a:p>
@@ -1061,7 +1075,7 @@
             <a:fld id="{1D8BD707-D9CF-40AE-B4C6-C98DA3205C09}" type="datetimeFigureOut">
               <a:rPr lang="en-US" smtClean="0"/>
               <a:pPr/>
-              <a:t>8/1/2011</a:t>
+              <a:t>6/28/2024</a:t>
             </a:fld>
             <a:endParaRPr lang="en-US"/>
           </a:p>
@@ -1151,10 +1165,9 @@
           <a:lstStyle/>
           <a:p>
             <a:r>
-              <a:rPr lang="en-US" smtClean="0"/>
+              <a:rPr lang="en-US"/>
               <a:t>Click to edit Master title style</a:t>
             </a:r>
-            <a:endParaRPr lang="en-US"/>
           </a:p>
         </p:txBody>
       </p:sp>
@@ -1208,38 +1221,37 @@
           <a:p>
             <a:pPr lvl="0"/>
             <a:r>
-              <a:rPr lang="en-US" smtClean="0"/>
+              <a:rPr lang="en-US"/>
               <a:t>Click to edit Master text styles</a:t>
             </a:r>
           </a:p>
           <a:p>
             <a:pPr lvl="1"/>
             <a:r>
-              <a:rPr lang="en-US" smtClean="0"/>
+              <a:rPr lang="en-US"/>
               <a:t>Second level</a:t>
             </a:r>
           </a:p>
           <a:p>
             <a:pPr lvl="2"/>
             <a:r>
-              <a:rPr lang="en-US" smtClean="0"/>
+              <a:rPr lang="en-US"/>
               <a:t>Third level</a:t>
             </a:r>
           </a:p>
           <a:p>
             <a:pPr lvl="3"/>
             <a:r>
-              <a:rPr lang="en-US" smtClean="0"/>
+              <a:rPr lang="en-US"/>
               <a:t>Fourth level</a:t>
             </a:r>
           </a:p>
           <a:p>
             <a:pPr lvl="4"/>
             <a:r>
-              <a:rPr lang="en-US" smtClean="0"/>
+              <a:rPr lang="en-US"/>
               <a:t>Fifth level</a:t>
             </a:r>
-            <a:endParaRPr lang="en-US"/>
           </a:p>
         </p:txBody>
       </p:sp>
@@ -1293,38 +1305,37 @@
           <a:p>
             <a:pPr lvl="0"/>
             <a:r>
-              <a:rPr lang="en-US" smtClean="0"/>
+              <a:rPr lang="en-US"/>
               <a:t>Click to edit Master text styles</a:t>
             </a:r>
           </a:p>
           <a:p>
             <a:pPr lvl="1"/>
             <a:r>
-              <a:rPr lang="en-US" smtClean="0"/>
+              <a:rPr lang="en-US"/>
               <a:t>Second level</a:t>
             </a:r>
           </a:p>
           <a:p>
             <a:pPr lvl="2"/>
             <a:r>
-              <a:rPr lang="en-US" smtClean="0"/>
+              <a:rPr lang="en-US"/>
               <a:t>Third level</a:t>
             </a:r>
           </a:p>
           <a:p>
             <a:pPr lvl="3"/>
             <a:r>
-              <a:rPr lang="en-US" smtClean="0"/>
+              <a:rPr lang="en-US"/>
               <a:t>Fourth level</a:t>
             </a:r>
           </a:p>
           <a:p>
             <a:pPr lvl="4"/>
             <a:r>
-              <a:rPr lang="en-US" smtClean="0"/>
+              <a:rPr lang="en-US"/>
               <a:t>Fifth level</a:t>
             </a:r>
-            <a:endParaRPr lang="en-US"/>
           </a:p>
         </p:txBody>
       </p:sp>
@@ -1346,7 +1357,7 @@
             <a:fld id="{1D8BD707-D9CF-40AE-B4C6-C98DA3205C09}" type="datetimeFigureOut">
               <a:rPr lang="en-US" smtClean="0"/>
               <a:pPr/>
-              <a:t>8/1/2011</a:t>
+              <a:t>6/28/2024</a:t>
             </a:fld>
             <a:endParaRPr lang="en-US"/>
           </a:p>
@@ -1440,10 +1451,9 @@
           </a:lstStyle>
           <a:p>
             <a:r>
-              <a:rPr lang="en-US" smtClean="0"/>
+              <a:rPr lang="en-US"/>
               <a:t>Click to edit Master title style</a:t>
             </a:r>
-            <a:endParaRPr lang="en-US"/>
           </a:p>
         </p:txBody>
       </p:sp>
@@ -1506,7 +1516,7 @@
           <a:p>
             <a:pPr lvl="0"/>
             <a:r>
-              <a:rPr lang="en-US" smtClean="0"/>
+              <a:rPr lang="en-US"/>
               <a:t>Click to edit Master text styles</a:t>
             </a:r>
           </a:p>
@@ -1562,38 +1572,37 @@
           <a:p>
             <a:pPr lvl="0"/>
             <a:r>
-              <a:rPr lang="en-US" smtClean="0"/>
+              <a:rPr lang="en-US"/>
               <a:t>Click to edit Master text styles</a:t>
             </a:r>
           </a:p>
           <a:p>
             <a:pPr lvl="1"/>
             <a:r>
-              <a:rPr lang="en-US" smtClean="0"/>
+              <a:rPr lang="en-US"/>
               <a:t>Second level</a:t>
             </a:r>
           </a:p>
           <a:p>
             <a:pPr lvl="2"/>
             <a:r>
-              <a:rPr lang="en-US" smtClean="0"/>
+              <a:rPr lang="en-US"/>
               <a:t>Third level</a:t>
             </a:r>
           </a:p>
           <a:p>
             <a:pPr lvl="3"/>
             <a:r>
-              <a:rPr lang="en-US" smtClean="0"/>
+              <a:rPr lang="en-US"/>
               <a:t>Fourth level</a:t>
             </a:r>
           </a:p>
           <a:p>
             <a:pPr lvl="4"/>
             <a:r>
-              <a:rPr lang="en-US" smtClean="0"/>
+              <a:rPr lang="en-US"/>
               <a:t>Fifth level</a:t>
             </a:r>
-            <a:endParaRPr lang="en-US"/>
           </a:p>
         </p:txBody>
       </p:sp>
@@ -1656,7 +1665,7 @@
           <a:p>
             <a:pPr lvl="0"/>
             <a:r>
-              <a:rPr lang="en-US" smtClean="0"/>
+              <a:rPr lang="en-US"/>
               <a:t>Click to edit Master text styles</a:t>
             </a:r>
           </a:p>
@@ -1712,38 +1721,37 @@
           <a:p>
             <a:pPr lvl="0"/>
             <a:r>
-              <a:rPr lang="en-US" smtClean="0"/>
+              <a:rPr lang="en-US"/>
               <a:t>Click to edit Master text styles</a:t>
             </a:r>
           </a:p>
           <a:p>
             <a:pPr lvl="1"/>
             <a:r>
-              <a:rPr lang="en-US" smtClean="0"/>
+              <a:rPr lang="en-US"/>
               <a:t>Second level</a:t>
             </a:r>
           </a:p>
           <a:p>
             <a:pPr lvl="2"/>
             <a:r>
-              <a:rPr lang="en-US" smtClean="0"/>
+              <a:rPr lang="en-US"/>
               <a:t>Third level</a:t>
             </a:r>
           </a:p>
           <a:p>
             <a:pPr lvl="3"/>
             <a:r>
-              <a:rPr lang="en-US" smtClean="0"/>
+              <a:rPr lang="en-US"/>
               <a:t>Fourth level</a:t>
             </a:r>
           </a:p>
           <a:p>
             <a:pPr lvl="4"/>
             <a:r>
-              <a:rPr lang="en-US" smtClean="0"/>
+              <a:rPr lang="en-US"/>
               <a:t>Fifth level</a:t>
             </a:r>
-            <a:endParaRPr lang="en-US"/>
           </a:p>
         </p:txBody>
       </p:sp>
@@ -1765,7 +1773,7 @@
             <a:fld id="{1D8BD707-D9CF-40AE-B4C6-C98DA3205C09}" type="datetimeFigureOut">
               <a:rPr lang="en-US" smtClean="0"/>
               <a:pPr/>
-              <a:t>8/1/2011</a:t>
+              <a:t>6/28/2024</a:t>
             </a:fld>
             <a:endParaRPr lang="en-US"/>
           </a:p>
@@ -1855,10 +1863,9 @@
           <a:lstStyle/>
           <a:p>
             <a:r>
-              <a:rPr lang="en-US" smtClean="0"/>
+              <a:rPr lang="en-US"/>
               <a:t>Click to edit Master title style</a:t>
             </a:r>
-            <a:endParaRPr lang="en-US"/>
           </a:p>
         </p:txBody>
       </p:sp>
@@ -1880,7 +1887,7 @@
             <a:fld id="{1D8BD707-D9CF-40AE-B4C6-C98DA3205C09}" type="datetimeFigureOut">
               <a:rPr lang="en-US" smtClean="0"/>
               <a:pPr/>
-              <a:t>8/1/2011</a:t>
+              <a:t>6/28/2024</a:t>
             </a:fld>
             <a:endParaRPr lang="en-US"/>
           </a:p>
@@ -1972,7 +1979,7 @@
             <a:fld id="{1D8BD707-D9CF-40AE-B4C6-C98DA3205C09}" type="datetimeFigureOut">
               <a:rPr lang="en-US" smtClean="0"/>
               <a:pPr/>
-              <a:t>8/1/2011</a:t>
+              <a:t>6/28/2024</a:t>
             </a:fld>
             <a:endParaRPr lang="en-US"/>
           </a:p>
@@ -2071,10 +2078,9 @@
           </a:lstStyle>
           <a:p>
             <a:r>
-              <a:rPr lang="en-US" smtClean="0"/>
+              <a:rPr lang="en-US"/>
               <a:t>Click to edit Master title style</a:t>
             </a:r>
-            <a:endParaRPr lang="en-US"/>
           </a:p>
         </p:txBody>
       </p:sp>
@@ -2128,38 +2134,37 @@
           <a:p>
             <a:pPr lvl="0"/>
             <a:r>
-              <a:rPr lang="en-US" smtClean="0"/>
+              <a:rPr lang="en-US"/>
               <a:t>Click to edit Master text styles</a:t>
             </a:r>
           </a:p>
           <a:p>
             <a:pPr lvl="1"/>
             <a:r>
-              <a:rPr lang="en-US" smtClean="0"/>
+              <a:rPr lang="en-US"/>
               <a:t>Second level</a:t>
             </a:r>
           </a:p>
           <a:p>
             <a:pPr lvl="2"/>
             <a:r>
-              <a:rPr lang="en-US" smtClean="0"/>
+              <a:rPr lang="en-US"/>
               <a:t>Third level</a:t>
             </a:r>
           </a:p>
           <a:p>
             <a:pPr lvl="3"/>
             <a:r>
-              <a:rPr lang="en-US" smtClean="0"/>
+              <a:rPr lang="en-US"/>
               <a:t>Fourth level</a:t>
             </a:r>
           </a:p>
           <a:p>
             <a:pPr lvl="4"/>
             <a:r>
-              <a:rPr lang="en-US" smtClean="0"/>
+              <a:rPr lang="en-US"/>
               <a:t>Fifth level</a:t>
             </a:r>
-            <a:endParaRPr lang="en-US"/>
           </a:p>
         </p:txBody>
       </p:sp>
@@ -2222,7 +2227,7 @@
           <a:p>
             <a:pPr lvl="0"/>
             <a:r>
-              <a:rPr lang="en-US" smtClean="0"/>
+              <a:rPr lang="en-US"/>
               <a:t>Click to edit Master text styles</a:t>
             </a:r>
           </a:p>
@@ -2246,7 +2251,7 @@
             <a:fld id="{1D8BD707-D9CF-40AE-B4C6-C98DA3205C09}" type="datetimeFigureOut">
               <a:rPr lang="en-US" smtClean="0"/>
               <a:pPr/>
-              <a:t>8/1/2011</a:t>
+              <a:t>6/28/2024</a:t>
             </a:fld>
             <a:endParaRPr lang="en-US"/>
           </a:p>
@@ -2345,10 +2350,9 @@
           </a:lstStyle>
           <a:p>
             <a:r>
-              <a:rPr lang="en-US" smtClean="0"/>
+              <a:rPr lang="en-US"/>
               <a:t>Click to edit Master title style</a:t>
             </a:r>
-            <a:endParaRPr lang="en-US"/>
           </a:p>
         </p:txBody>
       </p:sp>
@@ -2472,7 +2476,7 @@
           <a:p>
             <a:pPr lvl="0"/>
             <a:r>
-              <a:rPr lang="en-US" smtClean="0"/>
+              <a:rPr lang="en-US"/>
               <a:t>Click to edit Master text styles</a:t>
             </a:r>
           </a:p>
@@ -2496,7 +2500,7 @@
             <a:fld id="{1D8BD707-D9CF-40AE-B4C6-C98DA3205C09}" type="datetimeFigureOut">
               <a:rPr lang="en-US" smtClean="0"/>
               <a:pPr/>
-              <a:t>8/1/2011</a:t>
+              <a:t>6/28/2024</a:t>
             </a:fld>
             <a:endParaRPr lang="en-US"/>
           </a:p>
@@ -2601,10 +2605,9 @@
           <a:lstStyle/>
           <a:p>
             <a:r>
-              <a:rPr lang="en-US" smtClean="0"/>
+              <a:rPr lang="en-US"/>
               <a:t>Click to edit Master title style</a:t>
             </a:r>
-            <a:endParaRPr lang="en-US"/>
           </a:p>
         </p:txBody>
       </p:sp>
@@ -2635,38 +2638,37 @@
           <a:p>
             <a:pPr lvl="0"/>
             <a:r>
-              <a:rPr lang="en-US" smtClean="0"/>
+              <a:rPr lang="en-US"/>
               <a:t>Click to edit Master text styles</a:t>
             </a:r>
           </a:p>
           <a:p>
             <a:pPr lvl="1"/>
             <a:r>
-              <a:rPr lang="en-US" smtClean="0"/>
+              <a:rPr lang="en-US"/>
               <a:t>Second level</a:t>
             </a:r>
           </a:p>
           <a:p>
             <a:pPr lvl="2"/>
             <a:r>
-              <a:rPr lang="en-US" smtClean="0"/>
+              <a:rPr lang="en-US"/>
               <a:t>Third level</a:t>
             </a:r>
           </a:p>
           <a:p>
             <a:pPr lvl="3"/>
             <a:r>
-              <a:rPr lang="en-US" smtClean="0"/>
+              <a:rPr lang="en-US"/>
               <a:t>Fourth level</a:t>
             </a:r>
           </a:p>
           <a:p>
             <a:pPr lvl="4"/>
             <a:r>
-              <a:rPr lang="en-US" smtClean="0"/>
+              <a:rPr lang="en-US"/>
               <a:t>Fifth level</a:t>
             </a:r>
-            <a:endParaRPr lang="en-US"/>
           </a:p>
         </p:txBody>
       </p:sp>
@@ -2706,7 +2708,7 @@
             <a:fld id="{1D8BD707-D9CF-40AE-B4C6-C98DA3205C09}" type="datetimeFigureOut">
               <a:rPr lang="en-US" smtClean="0"/>
               <a:pPr/>
-              <a:t>8/1/2011</a:t>
+              <a:t>6/28/2024</a:t>
             </a:fld>
             <a:endParaRPr lang="en-US"/>
           </a:p>
@@ -3061,7 +3063,7 @@
 </file>
 
 <file path=ppt/slides/slide1.xml><?xml version="1.0" encoding="utf-8"?>
-<p:sld xmlns:p="http://schemas.openxmlformats.org/presentationml/2006/main" xmlns:a="http://schemas.openxmlformats.org/drawingml/2006/main" xmlns:r="http://schemas.openxmlformats.org/officeDocument/2006/relationships">
+<p:sld xmlns:a="http://schemas.openxmlformats.org/drawingml/2006/main" xmlns:r="http://schemas.openxmlformats.org/officeDocument/2006/relationships" xmlns:p="http://schemas.openxmlformats.org/presentationml/2006/main">
   <p:cSld>
     <p:spTree>
       <p:nvGrpSpPr>
@@ -3079,12 +3081,12 @@
       </p:grpSpPr>
       <p:sp>
         <p:nvSpPr>
-          <p:cNvPr name="Freeform 2" id="2"/>
+          <p:cNvPr id="2" name="Freeform 2"/>
           <p:cNvSpPr/>
           <p:nvPr/>
         </p:nvSpPr>
         <p:spPr>
-          <a:xfrm flipH="false" flipV="false" rot="0">
+          <a:xfrm>
             <a:off x="11237914" y="1160213"/>
             <a:ext cx="6433268" cy="6175937"/>
           </a:xfrm>
@@ -3093,9 +3095,9 @@
             <a:gdLst/>
             <a:ahLst/>
             <a:cxnLst/>
-            <a:rect r="r" b="b" t="t" l="l"/>
+            <a:rect l="l" t="t" r="r" b="b"/>
             <a:pathLst>
-              <a:path h="6175937" w="6433268">
+              <a:path w="6433268" h="6175937">
                 <a:moveTo>
                   <a:pt x="0" y="0"/>
                 </a:moveTo>
@@ -3118,19 +3120,19 @@
           <a:blipFill>
             <a:blip r:embed="rId2"/>
             <a:stretch>
-              <a:fillRect l="0" t="0" r="0" b="0"/>
+              <a:fillRect/>
             </a:stretch>
           </a:blipFill>
         </p:spPr>
       </p:sp>
       <p:sp>
         <p:nvSpPr>
-          <p:cNvPr name="Freeform 3" id="3"/>
+          <p:cNvPr id="3" name="Freeform 3"/>
           <p:cNvSpPr/>
           <p:nvPr/>
         </p:nvSpPr>
         <p:spPr>
-          <a:xfrm flipH="false" flipV="false" rot="0">
+          <a:xfrm>
             <a:off x="878801" y="7852634"/>
             <a:ext cx="4196931" cy="1405666"/>
           </a:xfrm>
@@ -3139,9 +3141,9 @@
             <a:gdLst/>
             <a:ahLst/>
             <a:cxnLst/>
-            <a:rect r="r" b="b" t="t" l="l"/>
+            <a:rect l="l" t="t" r="r" b="b"/>
             <a:pathLst>
-              <a:path h="1405666" w="4196931">
+              <a:path w="4196931" h="1405666">
                 <a:moveTo>
                   <a:pt x="0" y="0"/>
                 </a:moveTo>
@@ -3164,19 +3166,19 @@
           <a:blipFill>
             <a:blip r:embed="rId3"/>
             <a:stretch>
-              <a:fillRect l="0" t="-13099" r="-34069" b="-12946"/>
+              <a:fillRect t="-13099" r="-34069" b="-12946"/>
             </a:stretch>
           </a:blipFill>
         </p:spPr>
       </p:sp>
       <p:sp>
         <p:nvSpPr>
-          <p:cNvPr name="Freeform 4" id="4"/>
+          <p:cNvPr id="4" name="Freeform 4"/>
           <p:cNvSpPr/>
           <p:nvPr/>
         </p:nvSpPr>
         <p:spPr>
-          <a:xfrm flipH="false" flipV="false" rot="0">
+          <a:xfrm>
             <a:off x="12166242" y="7852634"/>
             <a:ext cx="3913039" cy="1431664"/>
           </a:xfrm>
@@ -3185,9 +3187,9 @@
             <a:gdLst/>
             <a:ahLst/>
             <a:cxnLst/>
-            <a:rect r="r" b="b" t="t" l="l"/>
+            <a:rect l="l" t="t" r="r" b="b"/>
             <a:pathLst>
-              <a:path h="1431664" w="3913039">
+              <a:path w="3913039" h="1431664">
                 <a:moveTo>
                   <a:pt x="0" y="0"/>
                 </a:moveTo>
@@ -3210,19 +3212,19 @@
           <a:blipFill>
             <a:blip r:embed="rId4"/>
             <a:stretch>
-              <a:fillRect l="0" t="-21990" r="-43316" b="-21074"/>
+              <a:fillRect t="-21990" r="-43316" b="-21074"/>
             </a:stretch>
           </a:blipFill>
         </p:spPr>
       </p:sp>
       <p:sp>
         <p:nvSpPr>
-          <p:cNvPr name="Freeform 5" id="5"/>
+          <p:cNvPr id="5" name="Freeform 5"/>
           <p:cNvSpPr/>
           <p:nvPr/>
         </p:nvSpPr>
         <p:spPr>
-          <a:xfrm flipH="false" flipV="false" rot="0">
+          <a:xfrm>
             <a:off x="0" y="170848"/>
             <a:ext cx="8231141" cy="1715705"/>
           </a:xfrm>
@@ -3231,9 +3233,9 @@
             <a:gdLst/>
             <a:ahLst/>
             <a:cxnLst/>
-            <a:rect r="r" b="b" t="t" l="l"/>
+            <a:rect l="l" t="t" r="r" b="b"/>
             <a:pathLst>
-              <a:path h="1715705" w="8231141">
+              <a:path w="8231141" h="1715705">
                 <a:moveTo>
                   <a:pt x="0" y="0"/>
                 </a:moveTo>
@@ -3256,19 +3258,19 @@
           <a:blipFill>
             <a:blip r:embed="rId5"/>
             <a:stretch>
-              <a:fillRect l="0" t="-66213" r="0" b="-25687"/>
+              <a:fillRect t="-66213" b="-25687"/>
             </a:stretch>
           </a:blipFill>
         </p:spPr>
       </p:sp>
       <p:sp>
         <p:nvSpPr>
-          <p:cNvPr name="TextBox 6" id="6"/>
-          <p:cNvSpPr txBox="true"/>
+          <p:cNvPr id="6" name="TextBox 6"/>
+          <p:cNvSpPr txBox="1"/>
           <p:nvPr/>
         </p:nvSpPr>
         <p:spPr>
-          <a:xfrm rot="0">
+          <a:xfrm>
             <a:off x="878801" y="4627773"/>
             <a:ext cx="9704030" cy="515727"/>
           </a:xfrm>
@@ -3277,7 +3279,7 @@
           </a:prstGeom>
         </p:spPr>
         <p:txBody>
-          <a:bodyPr anchor="t" rtlCol="false" tIns="0" lIns="0" bIns="0" rIns="0">
+          <a:bodyPr lIns="0" tIns="0" rIns="0" bIns="0" rtlCol="0" anchor="t">
             <a:spAutoFit/>
           </a:bodyPr>
           <a:lstStyle/>
@@ -3301,12 +3303,12 @@
       </p:sp>
       <p:sp>
         <p:nvSpPr>
-          <p:cNvPr name="TextBox 7" id="7"/>
-          <p:cNvSpPr txBox="true"/>
+          <p:cNvPr id="7" name="TextBox 7"/>
+          <p:cNvSpPr txBox="1"/>
           <p:nvPr/>
         </p:nvSpPr>
         <p:spPr>
-          <a:xfrm rot="0">
+          <a:xfrm>
             <a:off x="753943" y="3793081"/>
             <a:ext cx="9276428" cy="819150"/>
           </a:xfrm>
@@ -3315,7 +3317,7 @@
           </a:prstGeom>
         </p:spPr>
         <p:txBody>
-          <a:bodyPr anchor="t" rtlCol="false" tIns="0" lIns="0" bIns="0" rIns="0">
+          <a:bodyPr lIns="0" tIns="0" rIns="0" bIns="0" rtlCol="0" anchor="t">
             <a:spAutoFit/>
           </a:bodyPr>
           <a:lstStyle/>
@@ -3346,13 +3348,14 @@
 </file>
 
 <file path=ppt/slides/slide10.xml><?xml version="1.0" encoding="utf-8"?>
-<p:sld xmlns:p="http://schemas.openxmlformats.org/presentationml/2006/main" xmlns:a="http://schemas.openxmlformats.org/drawingml/2006/main" xmlns:r="http://schemas.openxmlformats.org/officeDocument/2006/relationships">
+<p:sld xmlns:a="http://schemas.openxmlformats.org/drawingml/2006/main" xmlns:r="http://schemas.openxmlformats.org/officeDocument/2006/relationships" xmlns:p="http://schemas.openxmlformats.org/presentationml/2006/main">
   <p:cSld>
     <p:bg>
       <p:bgPr>
         <a:solidFill>
           <a:srgbClr val="003C64"/>
         </a:solidFill>
+        <a:effectLst/>
       </p:bgPr>
     </p:bg>
     <p:spTree>
@@ -3371,12 +3374,12 @@
       </p:grpSpPr>
       <p:sp>
         <p:nvSpPr>
-          <p:cNvPr name="Freeform 2" id="2"/>
+          <p:cNvPr id="2" name="Freeform 2"/>
           <p:cNvSpPr/>
           <p:nvPr/>
         </p:nvSpPr>
         <p:spPr>
-          <a:xfrm flipH="false" flipV="false" rot="0">
+          <a:xfrm>
             <a:off x="1335676" y="1028700"/>
             <a:ext cx="15616647" cy="8126586"/>
           </a:xfrm>
@@ -3385,9 +3388,9 @@
             <a:gdLst/>
             <a:ahLst/>
             <a:cxnLst/>
-            <a:rect r="r" b="b" t="t" l="l"/>
+            <a:rect l="l" t="t" r="r" b="b"/>
             <a:pathLst>
-              <a:path h="8126586" w="15616647">
+              <a:path w="15616647" h="8126586">
                 <a:moveTo>
                   <a:pt x="0" y="0"/>
                 </a:moveTo>
@@ -3410,7 +3413,7 @@
           <a:blipFill>
             <a:blip r:embed="rId2"/>
             <a:stretch>
-              <a:fillRect l="0" t="0" r="0" b="0"/>
+              <a:fillRect/>
             </a:stretch>
           </a:blipFill>
         </p:spPr>
@@ -3424,13 +3427,14 @@
 </file>
 
 <file path=ppt/slides/slide11.xml><?xml version="1.0" encoding="utf-8"?>
-<p:sld xmlns:p="http://schemas.openxmlformats.org/presentationml/2006/main" xmlns:a="http://schemas.openxmlformats.org/drawingml/2006/main" xmlns:r="http://schemas.openxmlformats.org/officeDocument/2006/relationships">
+<p:sld xmlns:a="http://schemas.openxmlformats.org/drawingml/2006/main" xmlns:r="http://schemas.openxmlformats.org/officeDocument/2006/relationships" xmlns:p="http://schemas.openxmlformats.org/presentationml/2006/main">
   <p:cSld>
     <p:bg>
       <p:bgPr>
         <a:solidFill>
           <a:srgbClr val="D0FFFF"/>
         </a:solidFill>
+        <a:effectLst/>
       </p:bgPr>
     </p:bg>
     <p:spTree>
@@ -3449,12 +3453,12 @@
       </p:grpSpPr>
       <p:sp>
         <p:nvSpPr>
-          <p:cNvPr name="Freeform 2" id="2"/>
+          <p:cNvPr id="2" name="Freeform 2"/>
           <p:cNvSpPr/>
           <p:nvPr/>
         </p:nvSpPr>
         <p:spPr>
-          <a:xfrm flipH="false" flipV="false" rot="0">
+          <a:xfrm>
             <a:off x="1420307" y="728967"/>
             <a:ext cx="16045341" cy="7997129"/>
           </a:xfrm>
@@ -3463,9 +3467,9 @@
             <a:gdLst/>
             <a:ahLst/>
             <a:cxnLst/>
-            <a:rect r="r" b="b" t="t" l="l"/>
+            <a:rect l="l" t="t" r="r" b="b"/>
             <a:pathLst>
-              <a:path h="7997129" w="16045341">
+              <a:path w="16045341" h="7997129">
                 <a:moveTo>
                   <a:pt x="0" y="0"/>
                 </a:moveTo>
@@ -3488,7 +3492,7 @@
           <a:blipFill>
             <a:blip r:embed="rId2"/>
             <a:stretch>
-              <a:fillRect l="0" t="-3529" r="0" b="-15865"/>
+              <a:fillRect t="-3529" b="-15865"/>
             </a:stretch>
           </a:blipFill>
         </p:spPr>
@@ -3502,13 +3506,14 @@
 </file>
 
 <file path=ppt/slides/slide12.xml><?xml version="1.0" encoding="utf-8"?>
-<p:sld xmlns:p="http://schemas.openxmlformats.org/presentationml/2006/main" xmlns:a="http://schemas.openxmlformats.org/drawingml/2006/main" xmlns:r="http://schemas.openxmlformats.org/officeDocument/2006/relationships">
+<p:sld xmlns:a="http://schemas.openxmlformats.org/drawingml/2006/main" xmlns:r="http://schemas.openxmlformats.org/officeDocument/2006/relationships" xmlns:p="http://schemas.openxmlformats.org/presentationml/2006/main">
   <p:cSld>
     <p:bg>
       <p:bgPr>
         <a:solidFill>
           <a:srgbClr val="003C64"/>
         </a:solidFill>
+        <a:effectLst/>
       </p:bgPr>
     </p:bg>
     <p:spTree>
@@ -3527,12 +3532,12 @@
       </p:grpSpPr>
       <p:sp>
         <p:nvSpPr>
-          <p:cNvPr name="Freeform 2" id="2"/>
+          <p:cNvPr id="2" name="Freeform 2"/>
           <p:cNvSpPr/>
           <p:nvPr/>
         </p:nvSpPr>
         <p:spPr>
-          <a:xfrm flipH="false" flipV="false" rot="0">
+          <a:xfrm>
             <a:off x="2725591" y="0"/>
             <a:ext cx="12472845" cy="1694127"/>
           </a:xfrm>
@@ -3541,9 +3546,9 @@
             <a:gdLst/>
             <a:ahLst/>
             <a:cxnLst/>
-            <a:rect r="r" b="b" t="t" l="l"/>
+            <a:rect l="l" t="t" r="r" b="b"/>
             <a:pathLst>
-              <a:path h="1694127" w="12472845">
+              <a:path w="12472845" h="1694127">
                 <a:moveTo>
                   <a:pt x="0" y="0"/>
                 </a:moveTo>
@@ -3566,19 +3571,19 @@
           <a:blipFill>
             <a:blip r:embed="rId2"/>
             <a:stretch>
-              <a:fillRect l="0" t="-19949" r="0" b="-35295"/>
+              <a:fillRect t="-19949" b="-35295"/>
             </a:stretch>
           </a:blipFill>
         </p:spPr>
       </p:sp>
       <p:sp>
         <p:nvSpPr>
-          <p:cNvPr name="Freeform 3" id="3"/>
+          <p:cNvPr id="3" name="Freeform 3"/>
           <p:cNvSpPr/>
           <p:nvPr/>
         </p:nvSpPr>
         <p:spPr>
-          <a:xfrm flipH="false" flipV="false" rot="0">
+          <a:xfrm>
             <a:off x="2501416" y="4458034"/>
             <a:ext cx="13285168" cy="1370932"/>
           </a:xfrm>
@@ -3587,9 +3592,9 @@
             <a:gdLst/>
             <a:ahLst/>
             <a:cxnLst/>
-            <a:rect r="r" b="b" t="t" l="l"/>
+            <a:rect l="l" t="t" r="r" b="b"/>
             <a:pathLst>
-              <a:path h="1370932" w="13285168">
+              <a:path w="13285168" h="1370932">
                 <a:moveTo>
                   <a:pt x="0" y="0"/>
                 </a:moveTo>
@@ -3612,7 +3617,7 @@
           <a:blipFill>
             <a:blip r:embed="rId3"/>
             <a:stretch>
-              <a:fillRect l="0" t="0" r="0" b="0"/>
+              <a:fillRect/>
             </a:stretch>
           </a:blipFill>
         </p:spPr>
@@ -3626,7 +3631,7 @@
 </file>
 
 <file path=ppt/slides/slide13.xml><?xml version="1.0" encoding="utf-8"?>
-<p:sld xmlns:p="http://schemas.openxmlformats.org/presentationml/2006/main" xmlns:a="http://schemas.openxmlformats.org/drawingml/2006/main" xmlns:r="http://schemas.openxmlformats.org/officeDocument/2006/relationships">
+<p:sld xmlns:a="http://schemas.openxmlformats.org/drawingml/2006/main" xmlns:r="http://schemas.openxmlformats.org/officeDocument/2006/relationships" xmlns:p="http://schemas.openxmlformats.org/presentationml/2006/main">
   <p:cSld>
     <p:spTree>
       <p:nvGrpSpPr>
@@ -3644,12 +3649,12 @@
       </p:grpSpPr>
       <p:sp>
         <p:nvSpPr>
-          <p:cNvPr name="Freeform 2" id="2"/>
+          <p:cNvPr id="2" name="Freeform 2"/>
           <p:cNvSpPr/>
           <p:nvPr/>
         </p:nvSpPr>
         <p:spPr>
-          <a:xfrm flipH="false" flipV="false" rot="0">
+          <a:xfrm>
             <a:off x="2594030" y="3004900"/>
             <a:ext cx="13099940" cy="4277200"/>
           </a:xfrm>
@@ -3658,9 +3663,9 @@
             <a:gdLst/>
             <a:ahLst/>
             <a:cxnLst/>
-            <a:rect r="r" b="b" t="t" l="l"/>
+            <a:rect l="l" t="t" r="r" b="b"/>
             <a:pathLst>
-              <a:path h="4277200" w="13099940">
+              <a:path w="13099940" h="4277200">
                 <a:moveTo>
                   <a:pt x="0" y="0"/>
                 </a:moveTo>
@@ -3683,19 +3688,19 @@
           <a:blipFill>
             <a:blip r:embed="rId2"/>
             <a:stretch>
-              <a:fillRect l="0" t="0" r="0" b="0"/>
+              <a:fillRect/>
             </a:stretch>
           </a:blipFill>
         </p:spPr>
       </p:sp>
       <p:sp>
         <p:nvSpPr>
-          <p:cNvPr name="Freeform 3" id="3"/>
+          <p:cNvPr id="3" name="Freeform 3"/>
           <p:cNvSpPr/>
           <p:nvPr/>
         </p:nvSpPr>
         <p:spPr>
-          <a:xfrm flipH="false" flipV="false" rot="0">
+          <a:xfrm>
             <a:off x="3037010" y="0"/>
             <a:ext cx="12213981" cy="1517332"/>
           </a:xfrm>
@@ -3704,9 +3709,9 @@
             <a:gdLst/>
             <a:ahLst/>
             <a:cxnLst/>
-            <a:rect r="r" b="b" t="t" l="l"/>
+            <a:rect l="l" t="t" r="r" b="b"/>
             <a:pathLst>
-              <a:path h="1517332" w="12213981">
+              <a:path w="12213981" h="1517332">
                 <a:moveTo>
                   <a:pt x="0" y="0"/>
                 </a:moveTo>
@@ -3729,7 +3734,7 @@
           <a:blipFill>
             <a:blip r:embed="rId3"/>
             <a:stretch>
-              <a:fillRect l="0" t="0" r="0" b="0"/>
+              <a:fillRect/>
             </a:stretch>
           </a:blipFill>
         </p:spPr>
@@ -3743,13 +3748,14 @@
 </file>
 
 <file path=ppt/slides/slide2.xml><?xml version="1.0" encoding="utf-8"?>
-<p:sld xmlns:p="http://schemas.openxmlformats.org/presentationml/2006/main" xmlns:a="http://schemas.openxmlformats.org/drawingml/2006/main" xmlns:r="http://schemas.openxmlformats.org/officeDocument/2006/relationships">
+<p:sld xmlns:a="http://schemas.openxmlformats.org/drawingml/2006/main" xmlns:r="http://schemas.openxmlformats.org/officeDocument/2006/relationships" xmlns:p="http://schemas.openxmlformats.org/presentationml/2006/main">
   <p:cSld>
     <p:bg>
       <p:bgPr>
         <a:solidFill>
           <a:srgbClr val="003C64"/>
         </a:solidFill>
+        <a:effectLst/>
       </p:bgPr>
     </p:bg>
     <p:spTree>
@@ -3768,12 +3774,12 @@
       </p:grpSpPr>
       <p:sp>
         <p:nvSpPr>
-          <p:cNvPr name="Freeform 2" id="2"/>
+          <p:cNvPr id="2" name="Freeform 2"/>
           <p:cNvSpPr/>
           <p:nvPr/>
         </p:nvSpPr>
         <p:spPr>
-          <a:xfrm flipH="false" flipV="false" rot="0">
+          <a:xfrm>
             <a:off x="8009283" y="2057400"/>
             <a:ext cx="10278717" cy="6846514"/>
           </a:xfrm>
@@ -3782,9 +3788,9 @@
             <a:gdLst/>
             <a:ahLst/>
             <a:cxnLst/>
-            <a:rect r="r" b="b" t="t" l="l"/>
+            <a:rect l="l" t="t" r="r" b="b"/>
             <a:pathLst>
-              <a:path h="6846514" w="10278717">
+              <a:path w="10278717" h="6846514">
                 <a:moveTo>
                   <a:pt x="0" y="0"/>
                 </a:moveTo>
@@ -3807,19 +3813,19 @@
           <a:blipFill>
             <a:blip r:embed="rId2"/>
             <a:stretch>
-              <a:fillRect l="0" t="0" r="-4534" b="0"/>
+              <a:fillRect r="-4534"/>
             </a:stretch>
           </a:blipFill>
         </p:spPr>
       </p:sp>
       <p:grpSp>
         <p:nvGrpSpPr>
-          <p:cNvPr name="Group 3" id="3"/>
+          <p:cNvPr id="3" name="Group 3"/>
           <p:cNvGrpSpPr/>
           <p:nvPr/>
         </p:nvGrpSpPr>
         <p:grpSpPr>
-          <a:xfrm rot="0">
+          <a:xfrm>
             <a:off x="1185382" y="2057400"/>
             <a:ext cx="7197900" cy="4110518"/>
             <a:chOff x="0" y="0"/>
@@ -3828,12 +3834,12 @@
         </p:grpSpPr>
         <p:sp>
           <p:nvSpPr>
-            <p:cNvPr name="TextBox 4" id="4"/>
-            <p:cNvSpPr txBox="true"/>
+            <p:cNvPr id="4" name="TextBox 4"/>
+            <p:cNvSpPr txBox="1"/>
             <p:nvPr/>
           </p:nvSpPr>
           <p:spPr>
-            <a:xfrm rot="0">
+            <a:xfrm>
               <a:off x="0" y="0"/>
               <a:ext cx="9597200" cy="4125875"/>
             </a:xfrm>
@@ -3842,7 +3848,7 @@
             </a:prstGeom>
           </p:spPr>
           <p:txBody>
-            <a:bodyPr anchor="t" rtlCol="false" tIns="0" lIns="0" bIns="0" rIns="0">
+            <a:bodyPr lIns="0" tIns="0" rIns="0" bIns="0" rtlCol="0" anchor="t">
               <a:spAutoFit/>
             </a:bodyPr>
             <a:lstStyle/>
@@ -3868,17 +3874,23 @@
                   <a:spcPts val="12182"/>
                 </a:lnSpc>
               </a:pPr>
+              <a:endParaRPr lang="en-US" sz="10152">
+                <a:solidFill>
+                  <a:srgbClr val="FFFDF6"/>
+                </a:solidFill>
+                <a:latin typeface="Open Sans Bold"/>
+              </a:endParaRPr>
             </a:p>
           </p:txBody>
         </p:sp>
         <p:sp>
           <p:nvSpPr>
-            <p:cNvPr name="TextBox 5" id="5"/>
-            <p:cNvSpPr txBox="true"/>
+            <p:cNvPr id="5" name="TextBox 5"/>
+            <p:cNvSpPr txBox="1"/>
             <p:nvPr/>
           </p:nvSpPr>
           <p:spPr>
-            <a:xfrm rot="0">
+            <a:xfrm>
               <a:off x="0" y="4707089"/>
               <a:ext cx="9597200" cy="773602"/>
             </a:xfrm>
@@ -3887,7 +3899,7 @@
             </a:prstGeom>
           </p:spPr>
           <p:txBody>
-            <a:bodyPr anchor="t" rtlCol="false" tIns="0" lIns="0" bIns="0" rIns="0">
+            <a:bodyPr lIns="0" tIns="0" rIns="0" bIns="0" rtlCol="0" anchor="t">
               <a:spAutoFit/>
             </a:bodyPr>
             <a:lstStyle/>
@@ -3897,6 +3909,7 @@
                   <a:spcPts val="4616"/>
                 </a:lnSpc>
               </a:pPr>
+              <a:endParaRPr/>
             </a:p>
           </p:txBody>
         </p:sp>
@@ -3910,13 +3923,14 @@
 </file>
 
 <file path=ppt/slides/slide3.xml><?xml version="1.0" encoding="utf-8"?>
-<p:sld xmlns:p="http://schemas.openxmlformats.org/presentationml/2006/main" xmlns:a="http://schemas.openxmlformats.org/drawingml/2006/main" xmlns:r="http://schemas.openxmlformats.org/officeDocument/2006/relationships">
+<p:sld xmlns:a="http://schemas.openxmlformats.org/drawingml/2006/main" xmlns:r="http://schemas.openxmlformats.org/officeDocument/2006/relationships" xmlns:p="http://schemas.openxmlformats.org/presentationml/2006/main">
   <p:cSld>
     <p:bg>
       <p:bgPr>
         <a:solidFill>
           <a:srgbClr val="D0FFFF"/>
         </a:solidFill>
+        <a:effectLst/>
       </p:bgPr>
     </p:bg>
     <p:spTree>
@@ -3935,12 +3949,12 @@
       </p:grpSpPr>
       <p:sp>
         <p:nvSpPr>
-          <p:cNvPr name="Freeform 2" id="2"/>
+          <p:cNvPr id="2" name="Freeform 2"/>
           <p:cNvSpPr/>
           <p:nvPr/>
         </p:nvSpPr>
         <p:spPr>
-          <a:xfrm flipH="false" flipV="false" rot="0">
+          <a:xfrm>
             <a:off x="14626542" y="1614452"/>
             <a:ext cx="5794905" cy="6021529"/>
           </a:xfrm>
@@ -3949,9 +3963,9 @@
             <a:gdLst/>
             <a:ahLst/>
             <a:cxnLst/>
-            <a:rect r="r" b="b" t="t" l="l"/>
+            <a:rect l="l" t="t" r="r" b="b"/>
             <a:pathLst>
-              <a:path h="6021529" w="5794905">
+              <a:path w="5794905" h="6021529">
                 <a:moveTo>
                   <a:pt x="0" y="0"/>
                 </a:moveTo>
@@ -3974,19 +3988,19 @@
           <a:blipFill>
             <a:blip r:embed="rId2"/>
             <a:stretch>
-              <a:fillRect l="0" t="-4039" r="0" b="0"/>
+              <a:fillRect t="-4039"/>
             </a:stretch>
           </a:blipFill>
         </p:spPr>
       </p:sp>
       <p:sp>
         <p:nvSpPr>
-          <p:cNvPr name="Freeform 3" id="3"/>
+          <p:cNvPr id="3" name="Freeform 3"/>
           <p:cNvSpPr/>
           <p:nvPr/>
         </p:nvSpPr>
         <p:spPr>
-          <a:xfrm flipH="false" flipV="false" rot="2700000">
+          <a:xfrm rot="2700000">
             <a:off x="-1551384" y="2065478"/>
             <a:ext cx="4907811" cy="5200330"/>
           </a:xfrm>
@@ -3995,9 +4009,9 @@
             <a:gdLst/>
             <a:ahLst/>
             <a:cxnLst/>
-            <a:rect r="r" b="b" t="t" l="l"/>
+            <a:rect l="l" t="t" r="r" b="b"/>
             <a:pathLst>
-              <a:path h="5200330" w="4907811">
+              <a:path w="4907811" h="5200330">
                 <a:moveTo>
                   <a:pt x="0" y="0"/>
                 </a:moveTo>
@@ -4020,19 +4034,19 @@
           <a:blipFill>
             <a:blip r:embed="rId3"/>
             <a:stretch>
-              <a:fillRect l="0" t="0" r="0" b="0"/>
+              <a:fillRect/>
             </a:stretch>
           </a:blipFill>
         </p:spPr>
       </p:sp>
       <p:sp>
         <p:nvSpPr>
-          <p:cNvPr name="Freeform 4" id="4"/>
+          <p:cNvPr id="4" name="Freeform 4"/>
           <p:cNvSpPr/>
           <p:nvPr/>
         </p:nvSpPr>
         <p:spPr>
-          <a:xfrm flipH="false" flipV="false" rot="0">
+          <a:xfrm>
             <a:off x="2198192" y="2489122"/>
             <a:ext cx="13371655" cy="3488892"/>
           </a:xfrm>
@@ -4041,9 +4055,9 @@
             <a:gdLst/>
             <a:ahLst/>
             <a:cxnLst/>
-            <a:rect r="r" b="b" t="t" l="l"/>
+            <a:rect l="l" t="t" r="r" b="b"/>
             <a:pathLst>
-              <a:path h="3488892" w="13371655">
+              <a:path w="13371655" h="3488892">
                 <a:moveTo>
                   <a:pt x="0" y="0"/>
                 </a:moveTo>
@@ -4066,19 +4080,19 @@
           <a:blipFill>
             <a:blip r:embed="rId4"/>
             <a:stretch>
-              <a:fillRect l="0" t="0" r="0" b="0"/>
+              <a:fillRect/>
             </a:stretch>
           </a:blipFill>
         </p:spPr>
       </p:sp>
       <p:sp>
         <p:nvSpPr>
-          <p:cNvPr name="Freeform 5" id="5"/>
+          <p:cNvPr id="5" name="Freeform 5"/>
           <p:cNvSpPr/>
           <p:nvPr/>
         </p:nvSpPr>
         <p:spPr>
-          <a:xfrm flipH="false" flipV="false" rot="0">
+          <a:xfrm>
             <a:off x="2757328" y="0"/>
             <a:ext cx="12253383" cy="2542152"/>
           </a:xfrm>
@@ -4087,9 +4101,9 @@
             <a:gdLst/>
             <a:ahLst/>
             <a:cxnLst/>
-            <a:rect r="r" b="b" t="t" l="l"/>
+            <a:rect l="l" t="t" r="r" b="b"/>
             <a:pathLst>
-              <a:path h="2542152" w="12253383">
+              <a:path w="12253383" h="2542152">
                 <a:moveTo>
                   <a:pt x="0" y="0"/>
                 </a:moveTo>
@@ -4112,7 +4126,7 @@
           <a:blipFill>
             <a:blip r:embed="rId5"/>
             <a:stretch>
-              <a:fillRect l="0" t="0" r="0" b="0"/>
+              <a:fillRect/>
             </a:stretch>
           </a:blipFill>
         </p:spPr>
@@ -4126,13 +4140,14 @@
 </file>
 
 <file path=ppt/slides/slide4.xml><?xml version="1.0" encoding="utf-8"?>
-<p:sld xmlns:p="http://schemas.openxmlformats.org/presentationml/2006/main" xmlns:a="http://schemas.openxmlformats.org/drawingml/2006/main" xmlns:r="http://schemas.openxmlformats.org/officeDocument/2006/relationships">
+<p:sld xmlns:a="http://schemas.openxmlformats.org/drawingml/2006/main" xmlns:r="http://schemas.openxmlformats.org/officeDocument/2006/relationships" xmlns:p="http://schemas.openxmlformats.org/presentationml/2006/main">
   <p:cSld>
     <p:bg>
       <p:bgPr>
         <a:solidFill>
           <a:srgbClr val="003C64"/>
         </a:solidFill>
+        <a:effectLst/>
       </p:bgPr>
     </p:bg>
     <p:spTree>
@@ -4151,12 +4166,12 @@
       </p:grpSpPr>
       <p:sp>
         <p:nvSpPr>
-          <p:cNvPr name="Freeform 2" id="2"/>
+          <p:cNvPr id="2" name="Freeform 2"/>
           <p:cNvSpPr/>
           <p:nvPr/>
         </p:nvSpPr>
         <p:spPr>
-          <a:xfrm flipH="false" flipV="false" rot="0">
+          <a:xfrm>
             <a:off x="2236476" y="0"/>
             <a:ext cx="13087102" cy="2148507"/>
           </a:xfrm>
@@ -4165,9 +4180,9 @@
             <a:gdLst/>
             <a:ahLst/>
             <a:cxnLst/>
-            <a:rect r="r" b="b" t="t" l="l"/>
+            <a:rect l="l" t="t" r="r" b="b"/>
             <a:pathLst>
-              <a:path h="2148507" w="13087102">
+              <a:path w="13087102" h="2148507">
                 <a:moveTo>
                   <a:pt x="0" y="0"/>
                 </a:moveTo>
@@ -4190,19 +4205,19 @@
           <a:blipFill>
             <a:blip r:embed="rId2"/>
             <a:stretch>
-              <a:fillRect l="0" t="0" r="0" b="0"/>
+              <a:fillRect/>
             </a:stretch>
           </a:blipFill>
         </p:spPr>
       </p:sp>
       <p:sp>
         <p:nvSpPr>
-          <p:cNvPr name="Freeform 3" id="3"/>
+          <p:cNvPr id="3" name="Freeform 3"/>
           <p:cNvSpPr/>
           <p:nvPr/>
         </p:nvSpPr>
         <p:spPr>
-          <a:xfrm flipH="false" flipV="false" rot="0">
+          <a:xfrm>
             <a:off x="3334590" y="1706540"/>
             <a:ext cx="11618820" cy="8398474"/>
           </a:xfrm>
@@ -4211,9 +4226,9 @@
             <a:gdLst/>
             <a:ahLst/>
             <a:cxnLst/>
-            <a:rect r="r" b="b" t="t" l="l"/>
+            <a:rect l="l" t="t" r="r" b="b"/>
             <a:pathLst>
-              <a:path h="8398474" w="11618820">
+              <a:path w="11618820" h="8398474">
                 <a:moveTo>
                   <a:pt x="0" y="0"/>
                 </a:moveTo>
@@ -4236,7 +4251,7 @@
           <a:blipFill>
             <a:blip r:embed="rId3"/>
             <a:stretch>
-              <a:fillRect l="-1158" t="0" r="-1158" b="-3794"/>
+              <a:fillRect l="-1158" r="-1158" b="-3794"/>
             </a:stretch>
           </a:blipFill>
         </p:spPr>
@@ -4250,7 +4265,7 @@
 </file>
 
 <file path=ppt/slides/slide5.xml><?xml version="1.0" encoding="utf-8"?>
-<p:sld xmlns:p="http://schemas.openxmlformats.org/presentationml/2006/main" xmlns:a="http://schemas.openxmlformats.org/drawingml/2006/main" xmlns:r="http://schemas.openxmlformats.org/officeDocument/2006/relationships">
+<p:sld xmlns:a="http://schemas.openxmlformats.org/drawingml/2006/main" xmlns:r="http://schemas.openxmlformats.org/officeDocument/2006/relationships" xmlns:p="http://schemas.openxmlformats.org/presentationml/2006/main">
   <p:cSld>
     <p:spTree>
       <p:nvGrpSpPr>
@@ -4268,12 +4283,12 @@
       </p:grpSpPr>
       <p:sp>
         <p:nvSpPr>
-          <p:cNvPr name="Freeform 2" id="2"/>
+          <p:cNvPr id="2" name="Freeform 2"/>
           <p:cNvSpPr/>
           <p:nvPr/>
         </p:nvSpPr>
         <p:spPr>
-          <a:xfrm flipH="false" flipV="false" rot="0">
+          <a:xfrm>
             <a:off x="2610668" y="2953222"/>
             <a:ext cx="12047583" cy="2983642"/>
           </a:xfrm>
@@ -4282,9 +4297,9 @@
             <a:gdLst/>
             <a:ahLst/>
             <a:cxnLst/>
-            <a:rect r="r" b="b" t="t" l="l"/>
+            <a:rect l="l" t="t" r="r" b="b"/>
             <a:pathLst>
-              <a:path h="2983642" w="12047583">
+              <a:path w="12047583" h="2983642">
                 <a:moveTo>
                   <a:pt x="0" y="0"/>
                 </a:moveTo>
@@ -4307,7 +4322,7 @@
           <a:blipFill>
             <a:blip r:embed="rId2"/>
             <a:stretch>
-              <a:fillRect l="0" t="0" r="0" b="0"/>
+              <a:fillRect/>
             </a:stretch>
           </a:blipFill>
         </p:spPr>
@@ -4321,13 +4336,14 @@
 </file>
 
 <file path=ppt/slides/slide6.xml><?xml version="1.0" encoding="utf-8"?>
-<p:sld xmlns:p="http://schemas.openxmlformats.org/presentationml/2006/main" xmlns:a="http://schemas.openxmlformats.org/drawingml/2006/main" xmlns:r="http://schemas.openxmlformats.org/officeDocument/2006/relationships">
+<p:sld xmlns:a="http://schemas.openxmlformats.org/drawingml/2006/main" xmlns:r="http://schemas.openxmlformats.org/officeDocument/2006/relationships" xmlns:p="http://schemas.openxmlformats.org/presentationml/2006/main">
   <p:cSld>
     <p:bg>
       <p:bgPr>
         <a:solidFill>
           <a:srgbClr val="003C64"/>
         </a:solidFill>
+        <a:effectLst/>
       </p:bgPr>
     </p:bg>
     <p:spTree>
@@ -4346,12 +4362,12 @@
       </p:grpSpPr>
       <p:sp>
         <p:nvSpPr>
-          <p:cNvPr name="Freeform 2" id="2"/>
+          <p:cNvPr id="2" name="Freeform 2"/>
           <p:cNvSpPr/>
           <p:nvPr/>
         </p:nvSpPr>
         <p:spPr>
-          <a:xfrm flipH="false" flipV="false" rot="0">
+          <a:xfrm>
             <a:off x="3327457" y="204074"/>
             <a:ext cx="10801149" cy="1325496"/>
           </a:xfrm>
@@ -4360,9 +4376,9 @@
             <a:gdLst/>
             <a:ahLst/>
             <a:cxnLst/>
-            <a:rect r="r" b="b" t="t" l="l"/>
+            <a:rect l="l" t="t" r="r" b="b"/>
             <a:pathLst>
-              <a:path h="1325496" w="10801149">
+              <a:path w="10801149" h="1325496">
                 <a:moveTo>
                   <a:pt x="0" y="0"/>
                 </a:moveTo>
@@ -4385,11 +4401,47 @@
           <a:blipFill>
             <a:blip r:embed="rId2"/>
             <a:stretch>
-              <a:fillRect l="0" t="-39227" r="0" b="-37266"/>
+              <a:fillRect t="-39227" b="-37266"/>
             </a:stretch>
           </a:blipFill>
         </p:spPr>
       </p:sp>
+      <p:pic>
+        <p:nvPicPr>
+          <p:cNvPr id="4" name="Picture 3">
+            <a:extLst>
+              <a:ext uri="{FF2B5EF4-FFF2-40B4-BE49-F238E27FC236}">
+                <a16:creationId xmlns:a16="http://schemas.microsoft.com/office/drawing/2014/main" id="{473B4037-9877-40E5-B193-34F9FFCB7E5C}"/>
+              </a:ext>
+            </a:extLst>
+          </p:cNvPr>
+          <p:cNvPicPr>
+            <a:picLocks noChangeAspect="1"/>
+          </p:cNvPicPr>
+          <p:nvPr/>
+        </p:nvPicPr>
+        <p:blipFill>
+          <a:blip r:embed="rId3">
+            <a:extLst>
+              <a:ext uri="{28A0092B-C50C-407E-A947-70E740481C1C}">
+                <a14:useLocalDpi xmlns:a14="http://schemas.microsoft.com/office/drawing/2010/main" val="0"/>
+              </a:ext>
+            </a:extLst>
+          </a:blip>
+          <a:stretch>
+            <a:fillRect/>
+          </a:stretch>
+        </p:blipFill>
+        <p:spPr>
+          <a:xfrm>
+            <a:off x="1076340" y="1514916"/>
+            <a:ext cx="16135320" cy="8458200"/>
+          </a:xfrm>
+          <a:prstGeom prst="rect">
+            <a:avLst/>
+          </a:prstGeom>
+        </p:spPr>
+      </p:pic>
     </p:spTree>
   </p:cSld>
   <p:clrMapOvr>
@@ -4399,13 +4451,14 @@
 </file>
 
 <file path=ppt/slides/slide7.xml><?xml version="1.0" encoding="utf-8"?>
-<p:sld xmlns:p="http://schemas.openxmlformats.org/presentationml/2006/main" xmlns:a="http://schemas.openxmlformats.org/drawingml/2006/main" xmlns:r="http://schemas.openxmlformats.org/officeDocument/2006/relationships">
+<p:sld xmlns:a="http://schemas.openxmlformats.org/drawingml/2006/main" xmlns:r="http://schemas.openxmlformats.org/officeDocument/2006/relationships" xmlns:p="http://schemas.openxmlformats.org/presentationml/2006/main">
   <p:cSld>
     <p:bg>
       <p:bgPr>
         <a:solidFill>
           <a:srgbClr val="D0FFFF"/>
         </a:solidFill>
+        <a:effectLst/>
       </p:bgPr>
     </p:bg>
     <p:spTree>
@@ -4424,12 +4477,12 @@
       </p:grpSpPr>
       <p:sp>
         <p:nvSpPr>
-          <p:cNvPr name="Freeform 2" id="2"/>
+          <p:cNvPr id="2" name="Freeform 2"/>
           <p:cNvSpPr/>
           <p:nvPr/>
         </p:nvSpPr>
         <p:spPr>
-          <a:xfrm flipH="false" flipV="false" rot="0">
+          <a:xfrm>
             <a:off x="3294500" y="0"/>
             <a:ext cx="11699000" cy="1168168"/>
           </a:xfrm>
@@ -4438,9 +4491,9 @@
             <a:gdLst/>
             <a:ahLst/>
             <a:cxnLst/>
-            <a:rect r="r" b="b" t="t" l="l"/>
+            <a:rect l="l" t="t" r="r" b="b"/>
             <a:pathLst>
-              <a:path h="1168168" w="11699000">
+              <a:path w="11699000" h="1168168">
                 <a:moveTo>
                   <a:pt x="0" y="0"/>
                 </a:moveTo>
@@ -4463,11 +4516,47 @@
           <a:blipFill>
             <a:blip r:embed="rId2"/>
             <a:stretch>
-              <a:fillRect l="0" t="-17804" r="0" b="-33383"/>
+              <a:fillRect t="-17804" b="-33383"/>
             </a:stretch>
           </a:blipFill>
         </p:spPr>
       </p:sp>
+      <p:pic>
+        <p:nvPicPr>
+          <p:cNvPr id="4" name="Picture 3">
+            <a:extLst>
+              <a:ext uri="{FF2B5EF4-FFF2-40B4-BE49-F238E27FC236}">
+                <a16:creationId xmlns:a16="http://schemas.microsoft.com/office/drawing/2014/main" id="{91578693-9BE3-4BC1-9843-CB92720B1C1E}"/>
+              </a:ext>
+            </a:extLst>
+          </p:cNvPr>
+          <p:cNvPicPr>
+            <a:picLocks noChangeAspect="1"/>
+          </p:cNvPicPr>
+          <p:nvPr/>
+        </p:nvPicPr>
+        <p:blipFill>
+          <a:blip r:embed="rId3">
+            <a:extLst>
+              <a:ext uri="{28A0092B-C50C-407E-A947-70E740481C1C}">
+                <a14:useLocalDpi xmlns:a14="http://schemas.microsoft.com/office/drawing/2010/main" val="0"/>
+              </a:ext>
+            </a:extLst>
+          </a:blip>
+          <a:stretch>
+            <a:fillRect/>
+          </a:stretch>
+        </p:blipFill>
+        <p:spPr>
+          <a:xfrm>
+            <a:off x="304800" y="1168168"/>
+            <a:ext cx="17602200" cy="8801611"/>
+          </a:xfrm>
+          <a:prstGeom prst="rect">
+            <a:avLst/>
+          </a:prstGeom>
+        </p:spPr>
+      </p:pic>
     </p:spTree>
   </p:cSld>
   <p:clrMapOvr>
@@ -4477,13 +4566,14 @@
 </file>
 
 <file path=ppt/slides/slide8.xml><?xml version="1.0" encoding="utf-8"?>
-<p:sld xmlns:p="http://schemas.openxmlformats.org/presentationml/2006/main" xmlns:a="http://schemas.openxmlformats.org/drawingml/2006/main" xmlns:r="http://schemas.openxmlformats.org/officeDocument/2006/relationships">
+<p:sld xmlns:a="http://schemas.openxmlformats.org/drawingml/2006/main" xmlns:r="http://schemas.openxmlformats.org/officeDocument/2006/relationships" xmlns:p="http://schemas.openxmlformats.org/presentationml/2006/main">
   <p:cSld>
     <p:bg>
       <p:bgPr>
         <a:solidFill>
           <a:srgbClr val="003C64"/>
         </a:solidFill>
+        <a:effectLst/>
       </p:bgPr>
     </p:bg>
     <p:spTree>
@@ -4502,12 +4592,12 @@
       </p:grpSpPr>
       <p:sp>
         <p:nvSpPr>
-          <p:cNvPr name="Freeform 2" id="2"/>
+          <p:cNvPr id="2" name="Freeform 2"/>
           <p:cNvSpPr/>
           <p:nvPr/>
         </p:nvSpPr>
         <p:spPr>
-          <a:xfrm flipH="false" flipV="false" rot="0">
+          <a:xfrm>
             <a:off x="3213021" y="0"/>
             <a:ext cx="11134013" cy="1188860"/>
           </a:xfrm>
@@ -4516,9 +4606,9 @@
             <a:gdLst/>
             <a:ahLst/>
             <a:cxnLst/>
-            <a:rect r="r" b="b" t="t" l="l"/>
+            <a:rect l="l" t="t" r="r" b="b"/>
             <a:pathLst>
-              <a:path h="1188860" w="11134013">
+              <a:path w="11134013" h="1188860">
                 <a:moveTo>
                   <a:pt x="0" y="0"/>
                 </a:moveTo>
@@ -4541,11 +4631,47 @@
           <a:blipFill>
             <a:blip r:embed="rId2"/>
             <a:stretch>
-              <a:fillRect l="0" t="-34988" r="0" b="-41549"/>
+              <a:fillRect t="-34988" b="-41549"/>
             </a:stretch>
           </a:blipFill>
         </p:spPr>
       </p:sp>
+      <p:pic>
+        <p:nvPicPr>
+          <p:cNvPr id="4" name="Picture 3">
+            <a:extLst>
+              <a:ext uri="{FF2B5EF4-FFF2-40B4-BE49-F238E27FC236}">
+                <a16:creationId xmlns:a16="http://schemas.microsoft.com/office/drawing/2014/main" id="{ABDE5863-1E2F-4074-9E91-2A929BC431A1}"/>
+              </a:ext>
+            </a:extLst>
+          </p:cNvPr>
+          <p:cNvPicPr>
+            <a:picLocks noChangeAspect="1"/>
+          </p:cNvPicPr>
+          <p:nvPr/>
+        </p:nvPicPr>
+        <p:blipFill>
+          <a:blip r:embed="rId3">
+            <a:extLst>
+              <a:ext uri="{28A0092B-C50C-407E-A947-70E740481C1C}">
+                <a14:useLocalDpi xmlns:a14="http://schemas.microsoft.com/office/drawing/2010/main" val="0"/>
+              </a:ext>
+            </a:extLst>
+          </a:blip>
+          <a:stretch>
+            <a:fillRect/>
+          </a:stretch>
+        </p:blipFill>
+        <p:spPr>
+          <a:xfrm>
+            <a:off x="304800" y="1188860"/>
+            <a:ext cx="17754600" cy="8831440"/>
+          </a:xfrm>
+          <a:prstGeom prst="rect">
+            <a:avLst/>
+          </a:prstGeom>
+        </p:spPr>
+      </p:pic>
     </p:spTree>
   </p:cSld>
   <p:clrMapOvr>
@@ -4555,7 +4681,7 @@
 </file>
 
 <file path=ppt/slides/slide9.xml><?xml version="1.0" encoding="utf-8"?>
-<p:sld xmlns:p="http://schemas.openxmlformats.org/presentationml/2006/main" xmlns:a="http://schemas.openxmlformats.org/drawingml/2006/main" xmlns:r="http://schemas.openxmlformats.org/officeDocument/2006/relationships">
+<p:sld xmlns:a="http://schemas.openxmlformats.org/drawingml/2006/main" xmlns:r="http://schemas.openxmlformats.org/officeDocument/2006/relationships" xmlns:p="http://schemas.openxmlformats.org/presentationml/2006/main">
   <p:cSld>
     <p:spTree>
       <p:nvGrpSpPr>
@@ -4573,12 +4699,12 @@
       </p:grpSpPr>
       <p:sp>
         <p:nvSpPr>
-          <p:cNvPr name="Freeform 2" id="2"/>
+          <p:cNvPr id="2" name="Freeform 2"/>
           <p:cNvSpPr/>
           <p:nvPr/>
         </p:nvSpPr>
         <p:spPr>
-          <a:xfrm flipH="false" flipV="false" rot="0">
+          <a:xfrm>
             <a:off x="2287874" y="0"/>
             <a:ext cx="13244288" cy="2452224"/>
           </a:xfrm>
@@ -4587,9 +4713,9 @@
             <a:gdLst/>
             <a:ahLst/>
             <a:cxnLst/>
-            <a:rect r="r" b="b" t="t" l="l"/>
+            <a:rect l="l" t="t" r="r" b="b"/>
             <a:pathLst>
-              <a:path h="2452224" w="13244288">
+              <a:path w="13244288" h="2452224">
                 <a:moveTo>
                   <a:pt x="0" y="0"/>
                 </a:moveTo>
@@ -4612,7 +4738,7 @@
           <a:blipFill>
             <a:blip r:embed="rId2"/>
             <a:stretch>
-              <a:fillRect l="0" t="-11662" r="0" b="-18023"/>
+              <a:fillRect t="-11662" b="-18023"/>
             </a:stretch>
           </a:blipFill>
         </p:spPr>

</xml_diff>